<commit_message>
updated tutorial for indexed controls and bigraph expressions
</commit_message>
<xml_diff>
--- a/bigraphspace/docs/images/Tutorial_diagrams.pptx
+++ b/bigraphspace/docs/images/Tutorial_diagrams.pptx
@@ -8,6 +8,7 @@
     <p:sldId id="256" r:id="rId2"/>
     <p:sldId id="257" r:id="rId3"/>
     <p:sldId id="258" r:id="rId4"/>
+    <p:sldId id="259" r:id="rId5"/>
   </p:sldIdLst>
   <p:sldSz cx="9144000" cy="6858000" type="screen4x3"/>
   <p:notesSz cx="6858000" cy="9144000"/>
@@ -291,7 +292,7 @@
             <a:fld id="{1D8BD707-D9CF-40AE-B4C6-C98DA3205C09}" type="datetimeFigureOut">
               <a:rPr lang="en-US" smtClean="0"/>
               <a:pPr/>
-              <a:t>6/29/2009</a:t>
+              <a:t>7/29/2009</a:t>
             </a:fld>
             <a:endParaRPr lang="en-US" dirty="0"/>
           </a:p>
@@ -458,7 +459,7 @@
             <a:fld id="{1D8BD707-D9CF-40AE-B4C6-C98DA3205C09}" type="datetimeFigureOut">
               <a:rPr lang="en-US" smtClean="0"/>
               <a:pPr/>
-              <a:t>6/29/2009</a:t>
+              <a:t>7/29/2009</a:t>
             </a:fld>
             <a:endParaRPr lang="en-US" dirty="0"/>
           </a:p>
@@ -635,7 +636,7 @@
             <a:fld id="{1D8BD707-D9CF-40AE-B4C6-C98DA3205C09}" type="datetimeFigureOut">
               <a:rPr lang="en-US" smtClean="0"/>
               <a:pPr/>
-              <a:t>6/29/2009</a:t>
+              <a:t>7/29/2009</a:t>
             </a:fld>
             <a:endParaRPr lang="en-US" dirty="0"/>
           </a:p>
@@ -802,7 +803,7 @@
             <a:fld id="{1D8BD707-D9CF-40AE-B4C6-C98DA3205C09}" type="datetimeFigureOut">
               <a:rPr lang="en-US" smtClean="0"/>
               <a:pPr/>
-              <a:t>6/29/2009</a:t>
+              <a:t>7/29/2009</a:t>
             </a:fld>
             <a:endParaRPr lang="en-US" dirty="0"/>
           </a:p>
@@ -1045,7 +1046,7 @@
             <a:fld id="{1D8BD707-D9CF-40AE-B4C6-C98DA3205C09}" type="datetimeFigureOut">
               <a:rPr lang="en-US" smtClean="0"/>
               <a:pPr/>
-              <a:t>6/29/2009</a:t>
+              <a:t>7/29/2009</a:t>
             </a:fld>
             <a:endParaRPr lang="en-US" dirty="0"/>
           </a:p>
@@ -1330,7 +1331,7 @@
             <a:fld id="{1D8BD707-D9CF-40AE-B4C6-C98DA3205C09}" type="datetimeFigureOut">
               <a:rPr lang="en-US" smtClean="0"/>
               <a:pPr/>
-              <a:t>6/29/2009</a:t>
+              <a:t>7/29/2009</a:t>
             </a:fld>
             <a:endParaRPr lang="en-US" dirty="0"/>
           </a:p>
@@ -1749,7 +1750,7 @@
             <a:fld id="{1D8BD707-D9CF-40AE-B4C6-C98DA3205C09}" type="datetimeFigureOut">
               <a:rPr lang="en-US" smtClean="0"/>
               <a:pPr/>
-              <a:t>6/29/2009</a:t>
+              <a:t>7/29/2009</a:t>
             </a:fld>
             <a:endParaRPr lang="en-US" dirty="0"/>
           </a:p>
@@ -1864,7 +1865,7 @@
             <a:fld id="{1D8BD707-D9CF-40AE-B4C6-C98DA3205C09}" type="datetimeFigureOut">
               <a:rPr lang="en-US" smtClean="0"/>
               <a:pPr/>
-              <a:t>6/29/2009</a:t>
+              <a:t>7/29/2009</a:t>
             </a:fld>
             <a:endParaRPr lang="en-US" dirty="0"/>
           </a:p>
@@ -1956,7 +1957,7 @@
             <a:fld id="{1D8BD707-D9CF-40AE-B4C6-C98DA3205C09}" type="datetimeFigureOut">
               <a:rPr lang="en-US" smtClean="0"/>
               <a:pPr/>
-              <a:t>6/29/2009</a:t>
+              <a:t>7/29/2009</a:t>
             </a:fld>
             <a:endParaRPr lang="en-US" dirty="0"/>
           </a:p>
@@ -2230,7 +2231,7 @@
             <a:fld id="{1D8BD707-D9CF-40AE-B4C6-C98DA3205C09}" type="datetimeFigureOut">
               <a:rPr lang="en-US" smtClean="0"/>
               <a:pPr/>
-              <a:t>6/29/2009</a:t>
+              <a:t>7/29/2009</a:t>
             </a:fld>
             <a:endParaRPr lang="en-US" dirty="0"/>
           </a:p>
@@ -2480,7 +2481,7 @@
             <a:fld id="{1D8BD707-D9CF-40AE-B4C6-C98DA3205C09}" type="datetimeFigureOut">
               <a:rPr lang="en-US" smtClean="0"/>
               <a:pPr/>
-              <a:t>6/29/2009</a:t>
+              <a:t>7/29/2009</a:t>
             </a:fld>
             <a:endParaRPr lang="en-US" dirty="0"/>
           </a:p>
@@ -2690,7 +2691,7 @@
             <a:fld id="{1D8BD707-D9CF-40AE-B4C6-C98DA3205C09}" type="datetimeFigureOut">
               <a:rPr lang="en-US" smtClean="0"/>
               <a:pPr/>
-              <a:t>6/29/2009</a:t>
+              <a:t>7/29/2009</a:t>
             </a:fld>
             <a:endParaRPr lang="en-US" dirty="0"/>
           </a:p>
@@ -4901,6 +4902,334 @@
           <a:p>
             <a:pPr algn="ctr"/>
             <a:endParaRPr lang="en-GB"/>
+          </a:p>
+        </p:txBody>
+      </p:sp>
+    </p:spTree>
+  </p:cSld>
+  <p:clrMapOvr>
+    <a:masterClrMapping/>
+  </p:clrMapOvr>
+</p:sld>
+</file>
+
+<file path=ppt/slides/slide4.xml><?xml version="1.0" encoding="utf-8"?>
+<p:sld xmlns:a="http://schemas.openxmlformats.org/drawingml/2006/main" xmlns:r="http://schemas.openxmlformats.org/officeDocument/2006/relationships" xmlns:p="http://schemas.openxmlformats.org/presentationml/2006/main">
+  <p:cSld>
+    <p:spTree>
+      <p:nvGrpSpPr>
+        <p:cNvPr id="1" name=""/>
+        <p:cNvGrpSpPr/>
+        <p:nvPr/>
+      </p:nvGrpSpPr>
+      <p:grpSpPr>
+        <a:xfrm>
+          <a:off x="0" y="0"/>
+          <a:ext cx="0" cy="0"/>
+          <a:chOff x="0" y="0"/>
+          <a:chExt cx="0" cy="0"/>
+        </a:xfrm>
+      </p:grpSpPr>
+      <p:sp>
+        <p:nvSpPr>
+          <p:cNvPr id="2" name="Title 1"/>
+          <p:cNvSpPr>
+            <a:spLocks noGrp="1"/>
+          </p:cNvSpPr>
+          <p:nvPr>
+            <p:ph type="title"/>
+          </p:nvPr>
+        </p:nvSpPr>
+        <p:spPr/>
+        <p:txBody>
+          <a:bodyPr/>
+          <a:lstStyle/>
+          <a:p>
+            <a:r>
+              <a:rPr lang="en-GB" dirty="0" smtClean="0"/>
+              <a:t>Indexed control</a:t>
+            </a:r>
+            <a:endParaRPr lang="en-GB" dirty="0"/>
+          </a:p>
+        </p:txBody>
+      </p:sp>
+      <p:sp>
+        <p:nvSpPr>
+          <p:cNvPr id="3" name="Rectangle 2"/>
+          <p:cNvSpPr/>
+          <p:nvPr/>
+        </p:nvSpPr>
+        <p:spPr>
+          <a:xfrm>
+            <a:off x="2895600" y="2743200"/>
+            <a:ext cx="1371600" cy="304800"/>
+          </a:xfrm>
+          <a:prstGeom prst="rect">
+            <a:avLst/>
+          </a:prstGeom>
+          <a:noFill/>
+          <a:ln cap="rnd">
+            <a:solidFill>
+              <a:schemeClr val="tx1"/>
+            </a:solidFill>
+            <a:prstDash val="solid"/>
+          </a:ln>
+        </p:spPr>
+        <p:style>
+          <a:lnRef idx="2">
+            <a:schemeClr val="accent1">
+              <a:shade val="50000"/>
+            </a:schemeClr>
+          </a:lnRef>
+          <a:fillRef idx="1">
+            <a:schemeClr val="accent1"/>
+          </a:fillRef>
+          <a:effectRef idx="0">
+            <a:schemeClr val="accent1"/>
+          </a:effectRef>
+          <a:fontRef idx="minor">
+            <a:schemeClr val="lt1"/>
+          </a:fontRef>
+        </p:style>
+        <p:txBody>
+          <a:bodyPr rtlCol="0" anchor="ctr"/>
+          <a:lstStyle/>
+          <a:p>
+            <a:pPr algn="ctr"/>
+            <a:endParaRPr lang="en-GB" dirty="0"/>
+          </a:p>
+        </p:txBody>
+      </p:sp>
+      <p:sp>
+        <p:nvSpPr>
+          <p:cNvPr id="4" name="Rounded Rectangle 3"/>
+          <p:cNvSpPr/>
+          <p:nvPr/>
+        </p:nvSpPr>
+        <p:spPr>
+          <a:xfrm>
+            <a:off x="2514600" y="2209800"/>
+            <a:ext cx="2133600" cy="1219200"/>
+          </a:xfrm>
+          <a:prstGeom prst="roundRect">
+            <a:avLst/>
+          </a:prstGeom>
+          <a:noFill/>
+          <a:ln>
+            <a:solidFill>
+              <a:schemeClr val="tx1"/>
+            </a:solidFill>
+            <a:prstDash val="sysDash"/>
+          </a:ln>
+        </p:spPr>
+        <p:style>
+          <a:lnRef idx="2">
+            <a:schemeClr val="accent1">
+              <a:shade val="50000"/>
+            </a:schemeClr>
+          </a:lnRef>
+          <a:fillRef idx="1">
+            <a:schemeClr val="accent1"/>
+          </a:fillRef>
+          <a:effectRef idx="0">
+            <a:schemeClr val="accent1"/>
+          </a:effectRef>
+          <a:fontRef idx="minor">
+            <a:schemeClr val="lt1"/>
+          </a:fontRef>
+        </p:style>
+        <p:txBody>
+          <a:bodyPr rtlCol="0" anchor="ctr"/>
+          <a:lstStyle/>
+          <a:p>
+            <a:pPr algn="ctr"/>
+            <a:endParaRPr lang="en-GB" dirty="0"/>
+          </a:p>
+        </p:txBody>
+      </p:sp>
+      <p:sp>
+        <p:nvSpPr>
+          <p:cNvPr id="5" name="TextBox 4"/>
+          <p:cNvSpPr txBox="1"/>
+          <p:nvPr/>
+        </p:nvSpPr>
+        <p:spPr>
+          <a:xfrm>
+            <a:off x="2819400" y="2362200"/>
+            <a:ext cx="1441292" cy="369332"/>
+          </a:xfrm>
+          <a:prstGeom prst="rect">
+            <a:avLst/>
+          </a:prstGeom>
+          <a:noFill/>
+        </p:spPr>
+        <p:txBody>
+          <a:bodyPr wrap="none" rtlCol="0">
+            <a:spAutoFit/>
+          </a:bodyPr>
+          <a:lstStyle/>
+          <a:p>
+            <a:r>
+              <a:rPr lang="en-GB" dirty="0" smtClean="0"/>
+              <a:t>i</a:t>
+            </a:r>
+            <a:r>
+              <a:rPr lang="en-GB" dirty="0" smtClean="0"/>
+              <a:t>nteger&lt;4&gt;:</a:t>
+            </a:r>
+            <a:r>
+              <a:rPr lang="en-GB" i="1" dirty="0" smtClean="0"/>
+              <a:t>v</a:t>
+            </a:r>
+            <a:r>
+              <a:rPr lang="en-GB" i="1" baseline="-25000" dirty="0" smtClean="0"/>
+              <a:t>0</a:t>
+            </a:r>
+            <a:endParaRPr lang="en-GB" i="1" baseline="-25000" dirty="0"/>
+          </a:p>
+        </p:txBody>
+      </p:sp>
+      <p:sp>
+        <p:nvSpPr>
+          <p:cNvPr id="6" name="TextBox 5"/>
+          <p:cNvSpPr txBox="1"/>
+          <p:nvPr/>
+        </p:nvSpPr>
+        <p:spPr>
+          <a:xfrm>
+            <a:off x="5334000" y="2145268"/>
+            <a:ext cx="581698" cy="369332"/>
+          </a:xfrm>
+          <a:prstGeom prst="rect">
+            <a:avLst/>
+          </a:prstGeom>
+          <a:noFill/>
+        </p:spPr>
+        <p:txBody>
+          <a:bodyPr wrap="none" rtlCol="0">
+            <a:spAutoFit/>
+          </a:bodyPr>
+          <a:lstStyle/>
+          <a:p>
+            <a:r>
+              <a:rPr lang="en-GB" i="1" dirty="0" smtClean="0"/>
+              <a:t>root</a:t>
+            </a:r>
+            <a:endParaRPr lang="en-GB" i="1" dirty="0"/>
+          </a:p>
+        </p:txBody>
+      </p:sp>
+      <p:sp>
+        <p:nvSpPr>
+          <p:cNvPr id="7" name="TextBox 6"/>
+          <p:cNvSpPr txBox="1"/>
+          <p:nvPr/>
+        </p:nvSpPr>
+        <p:spPr>
+          <a:xfrm>
+            <a:off x="5715000" y="3124200"/>
+            <a:ext cx="365806" cy="369332"/>
+          </a:xfrm>
+          <a:prstGeom prst="rect">
+            <a:avLst/>
+          </a:prstGeom>
+          <a:noFill/>
+        </p:spPr>
+        <p:txBody>
+          <a:bodyPr wrap="none" rtlCol="0">
+            <a:spAutoFit/>
+          </a:bodyPr>
+          <a:lstStyle/>
+          <a:p>
+            <a:r>
+              <a:rPr lang="en-GB" i="1" dirty="0" smtClean="0"/>
+              <a:t>v</a:t>
+            </a:r>
+            <a:r>
+              <a:rPr lang="en-GB" i="1" baseline="-25000" dirty="0" smtClean="0"/>
+              <a:t>0</a:t>
+            </a:r>
+            <a:endParaRPr lang="en-GB" dirty="0"/>
+          </a:p>
+        </p:txBody>
+      </p:sp>
+      <p:cxnSp>
+        <p:nvCxnSpPr>
+          <p:cNvPr id="8" name="Straight Connector 7"/>
+          <p:cNvCxnSpPr>
+            <a:stCxn id="6" idx="2"/>
+            <a:endCxn id="9" idx="0"/>
+          </p:cNvCxnSpPr>
+          <p:nvPr/>
+        </p:nvCxnSpPr>
+        <p:spPr>
+          <a:xfrm rot="16200000" flipH="1">
+            <a:off x="5288924" y="2850524"/>
+            <a:ext cx="685800" cy="13951"/>
+          </a:xfrm>
+          <a:prstGeom prst="line">
+            <a:avLst/>
+          </a:prstGeom>
+        </p:spPr>
+        <p:style>
+          <a:lnRef idx="1">
+            <a:schemeClr val="accent1"/>
+          </a:lnRef>
+          <a:fillRef idx="0">
+            <a:schemeClr val="accent1"/>
+          </a:fillRef>
+          <a:effectRef idx="0">
+            <a:schemeClr val="accent1"/>
+          </a:effectRef>
+          <a:fontRef idx="minor">
+            <a:schemeClr val="tx1"/>
+          </a:fontRef>
+        </p:style>
+      </p:cxnSp>
+      <p:sp>
+        <p:nvSpPr>
+          <p:cNvPr id="9" name="Rectangle 8"/>
+          <p:cNvSpPr/>
+          <p:nvPr/>
+        </p:nvSpPr>
+        <p:spPr>
+          <a:xfrm>
+            <a:off x="5562600" y="3200400"/>
+            <a:ext cx="152400" cy="152400"/>
+          </a:xfrm>
+          <a:prstGeom prst="rect">
+            <a:avLst/>
+          </a:prstGeom>
+          <a:noFill/>
+          <a:ln cap="rnd">
+            <a:solidFill>
+              <a:schemeClr val="tx1"/>
+            </a:solidFill>
+            <a:prstDash val="solid"/>
+          </a:ln>
+        </p:spPr>
+        <p:style>
+          <a:lnRef idx="2">
+            <a:schemeClr val="accent1">
+              <a:shade val="50000"/>
+            </a:schemeClr>
+          </a:lnRef>
+          <a:fillRef idx="1">
+            <a:schemeClr val="accent1"/>
+          </a:fillRef>
+          <a:effectRef idx="0">
+            <a:schemeClr val="accent1"/>
+          </a:effectRef>
+          <a:fontRef idx="minor">
+            <a:schemeClr val="lt1"/>
+          </a:fontRef>
+        </p:style>
+        <p:txBody>
+          <a:bodyPr rtlCol="0" anchor="ctr"/>
+          <a:lstStyle/>
+          <a:p>
+            <a:pPr algn="ctr"/>
+            <a:endParaRPr lang="en-GB" dirty="0"/>
           </a:p>
         </p:txBody>
       </p:sp>

</xml_diff>

<commit_message>
extended term language with substitutions and closures; documented grammer in tutorial; updated examples.
</commit_message>
<xml_diff>
--- a/bigraphspace/docs/images/Tutorial_diagrams.pptx
+++ b/bigraphspace/docs/images/Tutorial_diagrams.pptx
@@ -292,7 +292,7 @@
             <a:fld id="{1D8BD707-D9CF-40AE-B4C6-C98DA3205C09}" type="datetimeFigureOut">
               <a:rPr lang="en-US" smtClean="0"/>
               <a:pPr/>
-              <a:t>7/29/2009</a:t>
+              <a:t>7/30/2009</a:t>
             </a:fld>
             <a:endParaRPr lang="en-US" dirty="0"/>
           </a:p>
@@ -459,7 +459,7 @@
             <a:fld id="{1D8BD707-D9CF-40AE-B4C6-C98DA3205C09}" type="datetimeFigureOut">
               <a:rPr lang="en-US" smtClean="0"/>
               <a:pPr/>
-              <a:t>7/29/2009</a:t>
+              <a:t>7/30/2009</a:t>
             </a:fld>
             <a:endParaRPr lang="en-US" dirty="0"/>
           </a:p>
@@ -636,7 +636,7 @@
             <a:fld id="{1D8BD707-D9CF-40AE-B4C6-C98DA3205C09}" type="datetimeFigureOut">
               <a:rPr lang="en-US" smtClean="0"/>
               <a:pPr/>
-              <a:t>7/29/2009</a:t>
+              <a:t>7/30/2009</a:t>
             </a:fld>
             <a:endParaRPr lang="en-US" dirty="0"/>
           </a:p>
@@ -803,7 +803,7 @@
             <a:fld id="{1D8BD707-D9CF-40AE-B4C6-C98DA3205C09}" type="datetimeFigureOut">
               <a:rPr lang="en-US" smtClean="0"/>
               <a:pPr/>
-              <a:t>7/29/2009</a:t>
+              <a:t>7/30/2009</a:t>
             </a:fld>
             <a:endParaRPr lang="en-US" dirty="0"/>
           </a:p>
@@ -1046,7 +1046,7 @@
             <a:fld id="{1D8BD707-D9CF-40AE-B4C6-C98DA3205C09}" type="datetimeFigureOut">
               <a:rPr lang="en-US" smtClean="0"/>
               <a:pPr/>
-              <a:t>7/29/2009</a:t>
+              <a:t>7/30/2009</a:t>
             </a:fld>
             <a:endParaRPr lang="en-US" dirty="0"/>
           </a:p>
@@ -1331,7 +1331,7 @@
             <a:fld id="{1D8BD707-D9CF-40AE-B4C6-C98DA3205C09}" type="datetimeFigureOut">
               <a:rPr lang="en-US" smtClean="0"/>
               <a:pPr/>
-              <a:t>7/29/2009</a:t>
+              <a:t>7/30/2009</a:t>
             </a:fld>
             <a:endParaRPr lang="en-US" dirty="0"/>
           </a:p>
@@ -1750,7 +1750,7 @@
             <a:fld id="{1D8BD707-D9CF-40AE-B4C6-C98DA3205C09}" type="datetimeFigureOut">
               <a:rPr lang="en-US" smtClean="0"/>
               <a:pPr/>
-              <a:t>7/29/2009</a:t>
+              <a:t>7/30/2009</a:t>
             </a:fld>
             <a:endParaRPr lang="en-US" dirty="0"/>
           </a:p>
@@ -1865,7 +1865,7 @@
             <a:fld id="{1D8BD707-D9CF-40AE-B4C6-C98DA3205C09}" type="datetimeFigureOut">
               <a:rPr lang="en-US" smtClean="0"/>
               <a:pPr/>
-              <a:t>7/29/2009</a:t>
+              <a:t>7/30/2009</a:t>
             </a:fld>
             <a:endParaRPr lang="en-US" dirty="0"/>
           </a:p>
@@ -1957,7 +1957,7 @@
             <a:fld id="{1D8BD707-D9CF-40AE-B4C6-C98DA3205C09}" type="datetimeFigureOut">
               <a:rPr lang="en-US" smtClean="0"/>
               <a:pPr/>
-              <a:t>7/29/2009</a:t>
+              <a:t>7/30/2009</a:t>
             </a:fld>
             <a:endParaRPr lang="en-US" dirty="0"/>
           </a:p>
@@ -2231,7 +2231,7 @@
             <a:fld id="{1D8BD707-D9CF-40AE-B4C6-C98DA3205C09}" type="datetimeFigureOut">
               <a:rPr lang="en-US" smtClean="0"/>
               <a:pPr/>
-              <a:t>7/29/2009</a:t>
+              <a:t>7/30/2009</a:t>
             </a:fld>
             <a:endParaRPr lang="en-US" dirty="0"/>
           </a:p>
@@ -2481,7 +2481,7 @@
             <a:fld id="{1D8BD707-D9CF-40AE-B4C6-C98DA3205C09}" type="datetimeFigureOut">
               <a:rPr lang="en-US" smtClean="0"/>
               <a:pPr/>
-              <a:t>7/29/2009</a:t>
+              <a:t>7/30/2009</a:t>
             </a:fld>
             <a:endParaRPr lang="en-US" dirty="0"/>
           </a:p>
@@ -2691,7 +2691,7 @@
             <a:fld id="{1D8BD707-D9CF-40AE-B4C6-C98DA3205C09}" type="datetimeFigureOut">
               <a:rPr lang="en-US" smtClean="0"/>
               <a:pPr/>
-              <a:t>7/29/2009</a:t>
+              <a:t>7/30/2009</a:t>
             </a:fld>
             <a:endParaRPr lang="en-US" dirty="0"/>
           </a:p>
@@ -3223,7 +3223,7 @@
         <p:spPr>
           <a:xfrm>
             <a:off x="2819400" y="2362200"/>
-            <a:ext cx="1756956" cy="369332"/>
+            <a:ext cx="1861151" cy="369332"/>
           </a:xfrm>
           <a:prstGeom prst="rect">
             <a:avLst/>
@@ -3238,7 +3238,7 @@
           <a:p>
             <a:r>
               <a:rPr lang="en-GB" dirty="0" smtClean="0"/>
-              <a:t>PhysicalRoom:</a:t>
+              <a:t>PhysicalRoom@</a:t>
             </a:r>
             <a:r>
               <a:rPr lang="en-GB" i="1" dirty="0" smtClean="0"/>
@@ -3308,7 +3308,7 @@
         <p:spPr>
           <a:xfrm>
             <a:off x="3276600" y="3048000"/>
-            <a:ext cx="2131994" cy="369332"/>
+            <a:ext cx="2276264" cy="369332"/>
           </a:xfrm>
           <a:prstGeom prst="rect">
             <a:avLst/>
@@ -3323,7 +3323,11 @@
           <a:p>
             <a:r>
               <a:rPr lang="en-GB" dirty="0" smtClean="0"/>
-              <a:t>PhysicalHandheld: </a:t>
+              <a:t>PhysicalHandheld</a:t>
+            </a:r>
+            <a:r>
+              <a:rPr lang="en-GB" dirty="0" smtClean="0"/>
+              <a:t>@</a:t>
             </a:r>
             <a:r>
               <a:rPr lang="en-GB" i="1" dirty="0" smtClean="0"/>
@@ -4126,7 +4130,7 @@
         <p:spPr>
           <a:xfrm>
             <a:off x="2819400" y="2362200"/>
-            <a:ext cx="1756956" cy="369332"/>
+            <a:ext cx="1861151" cy="369332"/>
           </a:xfrm>
           <a:prstGeom prst="rect">
             <a:avLst/>
@@ -4141,7 +4145,7 @@
           <a:p>
             <a:r>
               <a:rPr lang="en-GB" dirty="0" smtClean="0"/>
-              <a:t>PhysicalRoom:</a:t>
+              <a:t>PhysicalRoom@</a:t>
             </a:r>
             <a:r>
               <a:rPr lang="en-GB" i="1" dirty="0" smtClean="0"/>
@@ -4164,7 +4168,7 @@
         <p:spPr>
           <a:xfrm>
             <a:off x="3276600" y="3048000"/>
-            <a:ext cx="2131994" cy="369332"/>
+            <a:ext cx="2276264" cy="369332"/>
           </a:xfrm>
           <a:prstGeom prst="rect">
             <a:avLst/>
@@ -4179,7 +4183,7 @@
           <a:p>
             <a:r>
               <a:rPr lang="en-GB" dirty="0" smtClean="0"/>
-              <a:t>PhysicalHandheld: </a:t>
+              <a:t>PhysicalHandheld@</a:t>
             </a:r>
             <a:r>
               <a:rPr lang="en-GB" i="1" dirty="0" smtClean="0"/>
@@ -4581,7 +4585,7 @@
         <p:spPr>
           <a:xfrm>
             <a:off x="2819400" y="2362200"/>
-            <a:ext cx="1756956" cy="369332"/>
+            <a:ext cx="1861151" cy="369332"/>
           </a:xfrm>
           <a:prstGeom prst="rect">
             <a:avLst/>
@@ -4596,7 +4600,7 @@
           <a:p>
             <a:r>
               <a:rPr lang="en-GB" dirty="0" smtClean="0"/>
-              <a:t>PhysicalRoom:</a:t>
+              <a:t>PhysicalRoom@</a:t>
             </a:r>
             <a:r>
               <a:rPr lang="en-GB" i="1" dirty="0" smtClean="0"/>
@@ -4619,7 +4623,7 @@
         <p:spPr>
           <a:xfrm>
             <a:off x="3810000" y="3048000"/>
-            <a:ext cx="590931" cy="369332"/>
+            <a:ext cx="823367" cy="369332"/>
           </a:xfrm>
           <a:prstGeom prst="rect">
             <a:avLst/>
@@ -4634,11 +4638,11 @@
           <a:p>
             <a:r>
               <a:rPr lang="en-GB" i="1" dirty="0" smtClean="0"/>
-              <a:t>site</a:t>
-            </a:r>
-            <a:r>
-              <a:rPr lang="en-GB" i="1" baseline="-25000" dirty="0" smtClean="0"/>
-              <a:t>0</a:t>
+              <a:t>si</a:t>
+            </a:r>
+            <a:r>
+              <a:rPr lang="en-GB" i="1" dirty="0" smtClean="0"/>
+              <a:t>te [0]</a:t>
             </a:r>
             <a:endParaRPr lang="en-GB" i="1" dirty="0"/>
           </a:p>
@@ -4717,7 +4721,7 @@
         <p:spPr>
           <a:xfrm>
             <a:off x="6934200" y="4267200"/>
-            <a:ext cx="590931" cy="369332"/>
+            <a:ext cx="823367" cy="369332"/>
           </a:xfrm>
           <a:prstGeom prst="rect">
             <a:avLst/>
@@ -4731,12 +4735,8 @@
           <a:lstStyle/>
           <a:p>
             <a:r>
-              <a:rPr lang="en-GB" i="1" smtClean="0"/>
-              <a:t>site</a:t>
-            </a:r>
-            <a:r>
-              <a:rPr lang="en-GB" i="1" baseline="-25000" smtClean="0"/>
-              <a:t>0</a:t>
+              <a:rPr lang="en-GB" i="1" dirty="0" smtClean="0"/>
+              <a:t>site [0]</a:t>
             </a:r>
             <a:endParaRPr lang="en-GB" dirty="0"/>
           </a:p>
@@ -5056,7 +5056,7 @@
         <p:spPr>
           <a:xfrm>
             <a:off x="2819400" y="2362200"/>
-            <a:ext cx="1441292" cy="369332"/>
+            <a:ext cx="1417247" cy="369332"/>
           </a:xfrm>
           <a:prstGeom prst="rect">
             <a:avLst/>
@@ -5071,11 +5071,7 @@
           <a:p>
             <a:r>
               <a:rPr lang="en-GB" dirty="0" smtClean="0"/>
-              <a:t>i</a:t>
-            </a:r>
-            <a:r>
-              <a:rPr lang="en-GB" dirty="0" smtClean="0"/>
-              <a:t>nteger&lt;4&gt;:</a:t>
+              <a:t>4:integer@</a:t>
             </a:r>
             <a:r>
               <a:rPr lang="en-GB" i="1" dirty="0" smtClean="0"/>

</xml_diff>